<commit_message>
Fixed the analysis and set up the presentation
</commit_message>
<xml_diff>
--- a/Κοινή Διαχείριση Πόρων σε Επίπεδο Δήμων και Πόλεων με Νέες Τεχνολογίες - Project/Κοινή Διαχείριση Πόρων σε Επίπεδο Δήμων και Πόλεων με Νέες Τεχνολογίες - Presentation.pptx
+++ b/Κοινή Διαχείριση Πόρων σε Επίπεδο Δήμων και Πόλεων με Νέες Τεχνολογίες - Project/Κοινή Διαχείριση Πόρων σε Επίπεδο Δήμων και Πόλεων με Νέες Τεχνολογίες - Presentation.pptx
@@ -1307,7 +1307,7 @@
       </p:grpSpPr>
       <p:sp>
         <p:nvSpPr>
-          <p:cNvPr id="87" name="Google Shape;87;g39d132a315d_0_30:notes"/>
+          <p:cNvPr id="87" name="Google Shape;87;g39d132a315d_0_25:notes"/>
           <p:cNvSpPr/>
           <p:nvPr>
             <p:ph idx="2" type="sldImg"/>
@@ -1342,7 +1342,7 @@
       </p:sp>
       <p:sp>
         <p:nvSpPr>
-          <p:cNvPr id="88" name="Google Shape;88;g39d132a315d_0_30:notes"/>
+          <p:cNvPr id="88" name="Google Shape;88;g39d132a315d_0_25:notes"/>
           <p:cNvSpPr txBox="1"/>
           <p:nvPr>
             <p:ph idx="1" type="body"/>
@@ -1406,7 +1406,7 @@
       </p:grpSpPr>
       <p:sp>
         <p:nvSpPr>
-          <p:cNvPr id="93" name="Google Shape;93;g39d132a315d_0_20:notes"/>
+          <p:cNvPr id="93" name="Google Shape;93;g39d132a315d_0_30:notes"/>
           <p:cNvSpPr/>
           <p:nvPr>
             <p:ph idx="2" type="sldImg"/>
@@ -1441,7 +1441,7 @@
       </p:sp>
       <p:sp>
         <p:nvSpPr>
-          <p:cNvPr id="94" name="Google Shape;94;g39d132a315d_0_20:notes"/>
+          <p:cNvPr id="94" name="Google Shape;94;g39d132a315d_0_30:notes"/>
           <p:cNvSpPr txBox="1"/>
           <p:nvPr>
             <p:ph idx="1" type="body"/>
@@ -1505,7 +1505,7 @@
       </p:grpSpPr>
       <p:sp>
         <p:nvSpPr>
-          <p:cNvPr id="99" name="Google Shape;99;g39d132a315d_0_25:notes"/>
+          <p:cNvPr id="99" name="Google Shape;99;g39d132a315d_0_20:notes"/>
           <p:cNvSpPr/>
           <p:nvPr>
             <p:ph idx="2" type="sldImg"/>
@@ -1540,7 +1540,7 @@
       </p:sp>
       <p:sp>
         <p:nvSpPr>
-          <p:cNvPr id="100" name="Google Shape;100;g39d132a315d_0_25:notes"/>
+          <p:cNvPr id="100" name="Google Shape;100;g39d132a315d_0_20:notes"/>
           <p:cNvSpPr txBox="1"/>
           <p:nvPr>
             <p:ph idx="1" type="body"/>
@@ -6284,7 +6284,8 @@
               <a:buNone/>
             </a:pPr>
             <a:r>
-              <a:t/>
+              <a:rPr lang="el"/>
+              <a:t>ΕΙΣΑΓΩΓΗ</a:t>
             </a:r>
             <a:endParaRPr/>
           </a:p>
@@ -6387,7 +6388,8 @@
               <a:buNone/>
             </a:pPr>
             <a:r>
-              <a:t/>
+              <a:rPr lang="el"/>
+              <a:t>ΠΡΟΒΛΗΜΑ</a:t>
             </a:r>
             <a:endParaRPr/>
           </a:p>
@@ -6490,7 +6492,8 @@
               <a:buNone/>
             </a:pPr>
             <a:r>
-              <a:t/>
+              <a:rPr lang="el"/>
+              <a:t>ΧΡΗΣΤΕΣ &amp; ΕΝΔΙΑΦΕΡΟΜΕΝΟΙ</a:t>
             </a:r>
             <a:endParaRPr/>
           </a:p>
@@ -6593,7 +6596,8 @@
               <a:buNone/>
             </a:pPr>
             <a:r>
-              <a:t/>
+              <a:rPr lang="el"/>
+              <a:t>ΑΠΑΙΤΗΣΕΙΣ &amp; ΠΕΡΙΟΡΙΣΜΟΙ</a:t>
             </a:r>
             <a:endParaRPr/>
           </a:p>
@@ -6696,7 +6700,8 @@
               <a:buNone/>
             </a:pPr>
             <a:r>
-              <a:t/>
+              <a:rPr lang="el"/>
+              <a:t>ΤΡΕΧΟΥΣΑ &amp; ΤΡΙΒΗ</a:t>
             </a:r>
             <a:endParaRPr/>
           </a:p>
@@ -6799,7 +6804,8 @@
               <a:buNone/>
             </a:pPr>
             <a:r>
-              <a:t/>
+              <a:rPr lang="el"/>
+              <a:t>SWOT</a:t>
             </a:r>
             <a:endParaRPr/>
           </a:p>
@@ -6899,10 +6905,16 @@
               <a:spcAft>
                 <a:spcPts val="0"/>
               </a:spcAft>
+              <a:buClr>
+                <a:schemeClr val="dk1"/>
+              </a:buClr>
+              <a:buSzPct val="39285"/>
+              <a:buFont typeface="Arial"/>
               <a:buNone/>
             </a:pPr>
             <a:r>
-              <a:t/>
+              <a:rPr lang="el"/>
+              <a:t>SMART</a:t>
             </a:r>
             <a:endParaRPr/>
           </a:p>
@@ -7005,7 +7017,8 @@
               <a:buNone/>
             </a:pPr>
             <a:r>
-              <a:t/>
+              <a:rPr lang="el"/>
+              <a:t>KPI &amp; Κριτηρια αποδοχης </a:t>
             </a:r>
             <a:endParaRPr/>
           </a:p>
@@ -7108,7 +7121,8 @@
               <a:buNone/>
             </a:pPr>
             <a:r>
-              <a:t/>
+              <a:rPr lang="el"/>
+              <a:t>SMART CITY - IMS</a:t>
             </a:r>
             <a:endParaRPr/>
           </a:p>

</xml_diff>